<commit_message>
SC-66: Fix case when linked excel file is removed
</commit_message>
<xml_diff>
--- a/ShapeCrawler.Tests.Unit/Resource/009_table.pptx
+++ b/ShapeCrawler.Tests.Unit/Resource/009_table.pptx
@@ -8197,7 +8197,7 @@
           <p:nvPr/>
         </p:nvPicPr>
         <p:blipFill>
-          <a:blip r:embed="rId2">
+          <a:blip r:embed="rId3">
             <a:extLst>
               <a:ext uri="{28A0092B-C50C-407E-A947-70E740481C1C}">
                 <a14:useLocalDpi xmlns:a14="http://schemas.microsoft.com/office/drawing/2010/main" val="0"/>
@@ -8246,12 +8246,12 @@
           <a:graphicData uri="http://schemas.openxmlformats.org/presentationml/2006/ole">
             <mc:AlternateContent xmlns:mc="http://schemas.openxmlformats.org/markup-compatibility/2006">
               <mc:Choice xmlns:v="urn:schemas-microsoft-com:vml" Requires="v">
-                <p:oleObj name="Document" r:id="rId3" imgW="5940848" imgH="323743" progId="Word.Document.12">
+                <p:oleObj spid="_x0000_s1026" name="Document" r:id="rId4" imgW="5940848" imgH="323743" progId="Word.Document.12">
                   <p:embed/>
                 </p:oleObj>
               </mc:Choice>
               <mc:Fallback>
-                <p:oleObj name="Document" r:id="rId3" imgW="5940848" imgH="323743" progId="Word.Document.12">
+                <p:oleObj name="Document" r:id="rId4" imgW="5940848" imgH="323743" progId="Word.Document.12">
                   <p:embed/>
                   <p:pic>
                     <p:nvPicPr>
@@ -8262,7 +8262,7 @@
                       <p:nvPr/>
                     </p:nvPicPr>
                     <p:blipFill>
-                      <a:blip r:embed="rId4">
+                      <a:blip r:embed="rId5">
                         <a:extLst>
                           <a:ext uri="{28A0092B-C50C-407E-A947-70E740481C1C}">
                             <a14:useLocalDpi xmlns:a14="http://schemas.microsoft.com/office/drawing/2010/main" val="0"/>
@@ -8351,12 +8351,12 @@
           <a:graphicData uri="http://schemas.openxmlformats.org/presentationml/2006/ole">
             <mc:AlternateContent xmlns:mc="http://schemas.openxmlformats.org/markup-compatibility/2006">
               <mc:Choice xmlns:v="urn:schemas-microsoft-com:vml" Requires="v">
-                <p:oleObj name="Packager Shell Object" showAsIcon="1" r:id="rId5" imgW="485640" imgH="372960" progId="Package">
+                <p:oleObj spid="_x0000_s1027" name="Packager Shell Object" showAsIcon="1" r:id="rId6" imgW="485640" imgH="372960" progId="Package">
                   <p:embed/>
                 </p:oleObj>
               </mc:Choice>
               <mc:Fallback>
-                <p:oleObj name="Packager Shell Object" showAsIcon="1" r:id="rId5" imgW="485640" imgH="372960" progId="Package">
+                <p:oleObj name="Packager Shell Object" showAsIcon="1" r:id="rId6" imgW="485640" imgH="372960" progId="Package">
                   <p:embed/>
                   <p:pic>
                     <p:nvPicPr>
@@ -8371,7 +8371,7 @@
                       <p:nvPr/>
                     </p:nvPicPr>
                     <p:blipFill>
-                      <a:blip r:embed="rId6"/>
+                      <a:blip r:embed="rId7"/>
                       <a:stretch>
                         <a:fillRect/>
                       </a:stretch>
@@ -8811,7 +8811,7 @@
       </p:graphicFrame>
       <p:graphicFrame>
         <p:nvGraphicFramePr>
-          <p:cNvPr id="6" name="Диаграмма 5">
+          <p:cNvPr id="6" name="Chart 5">
             <a:extLst>
               <a:ext uri="{FF2B5EF4-FFF2-40B4-BE49-F238E27FC236}">
                 <a16:creationId xmlns:a16="http://schemas.microsoft.com/office/drawing/2014/main" id="{2E5B81C2-7C67-4CA9-9A10-F0D4E02FBF8B}"/>
@@ -8824,7 +8824,7 @@
           <p:nvPr>
             <p:extLst>
               <p:ext uri="{D42A27DB-BD31-4B8C-83A1-F6EECF244321}">
-                <p14:modId xmlns:p14="http://schemas.microsoft.com/office/powerpoint/2010/main" val="4286034354"/>
+                <p14:modId xmlns:p14="http://schemas.microsoft.com/office/powerpoint/2010/main" val="1342746515"/>
               </p:ext>
             </p:extLst>
           </p:nvPr>

</xml_diff>